<commit_message>
change home work link for 1 lesson
</commit_message>
<xml_diff>
--- a/Lesson1/Lesson1-2.pptx
+++ b/Lesson1/Lesson1-2.pptx
@@ -273,7 +273,7 @@
           <a:p>
             <a:fld id="{4536FCE1-CC95-43C2-9AFE-9E28C1121DF5}" type="datetimeFigureOut">
               <a:rPr lang="en-US" smtClean="0"/>
-              <a:t>10/1/2019</a:t>
+              <a:t>4/7/2021</a:t>
             </a:fld>
             <a:endParaRPr lang="en-US"/>
           </a:p>
@@ -473,7 +473,7 @@
           <a:p>
             <a:fld id="{4536FCE1-CC95-43C2-9AFE-9E28C1121DF5}" type="datetimeFigureOut">
               <a:rPr lang="en-US" smtClean="0"/>
-              <a:t>10/1/2019</a:t>
+              <a:t>4/7/2021</a:t>
             </a:fld>
             <a:endParaRPr lang="en-US"/>
           </a:p>
@@ -683,7 +683,7 @@
           <a:p>
             <a:fld id="{4536FCE1-CC95-43C2-9AFE-9E28C1121DF5}" type="datetimeFigureOut">
               <a:rPr lang="en-US" smtClean="0"/>
-              <a:t>10/1/2019</a:t>
+              <a:t>4/7/2021</a:t>
             </a:fld>
             <a:endParaRPr lang="en-US"/>
           </a:p>
@@ -883,7 +883,7 @@
           <a:p>
             <a:fld id="{4536FCE1-CC95-43C2-9AFE-9E28C1121DF5}" type="datetimeFigureOut">
               <a:rPr lang="en-US" smtClean="0"/>
-              <a:t>10/1/2019</a:t>
+              <a:t>4/7/2021</a:t>
             </a:fld>
             <a:endParaRPr lang="en-US"/>
           </a:p>
@@ -1159,7 +1159,7 @@
           <a:p>
             <a:fld id="{4536FCE1-CC95-43C2-9AFE-9E28C1121DF5}" type="datetimeFigureOut">
               <a:rPr lang="en-US" smtClean="0"/>
-              <a:t>10/1/2019</a:t>
+              <a:t>4/7/2021</a:t>
             </a:fld>
             <a:endParaRPr lang="en-US"/>
           </a:p>
@@ -1427,7 +1427,7 @@
           <a:p>
             <a:fld id="{4536FCE1-CC95-43C2-9AFE-9E28C1121DF5}" type="datetimeFigureOut">
               <a:rPr lang="en-US" smtClean="0"/>
-              <a:t>10/1/2019</a:t>
+              <a:t>4/7/2021</a:t>
             </a:fld>
             <a:endParaRPr lang="en-US"/>
           </a:p>
@@ -1842,7 +1842,7 @@
           <a:p>
             <a:fld id="{4536FCE1-CC95-43C2-9AFE-9E28C1121DF5}" type="datetimeFigureOut">
               <a:rPr lang="en-US" smtClean="0"/>
-              <a:t>10/1/2019</a:t>
+              <a:t>4/7/2021</a:t>
             </a:fld>
             <a:endParaRPr lang="en-US"/>
           </a:p>
@@ -1984,7 +1984,7 @@
           <a:p>
             <a:fld id="{4536FCE1-CC95-43C2-9AFE-9E28C1121DF5}" type="datetimeFigureOut">
               <a:rPr lang="en-US" smtClean="0"/>
-              <a:t>10/1/2019</a:t>
+              <a:t>4/7/2021</a:t>
             </a:fld>
             <a:endParaRPr lang="en-US"/>
           </a:p>
@@ -2097,7 +2097,7 @@
           <a:p>
             <a:fld id="{4536FCE1-CC95-43C2-9AFE-9E28C1121DF5}" type="datetimeFigureOut">
               <a:rPr lang="en-US" smtClean="0"/>
-              <a:t>10/1/2019</a:t>
+              <a:t>4/7/2021</a:t>
             </a:fld>
             <a:endParaRPr lang="en-US"/>
           </a:p>
@@ -2410,7 +2410,7 @@
           <a:p>
             <a:fld id="{4536FCE1-CC95-43C2-9AFE-9E28C1121DF5}" type="datetimeFigureOut">
               <a:rPr lang="en-US" smtClean="0"/>
-              <a:t>10/1/2019</a:t>
+              <a:t>4/7/2021</a:t>
             </a:fld>
             <a:endParaRPr lang="en-US"/>
           </a:p>
@@ -2699,7 +2699,7 @@
           <a:p>
             <a:fld id="{4536FCE1-CC95-43C2-9AFE-9E28C1121DF5}" type="datetimeFigureOut">
               <a:rPr lang="en-US" smtClean="0"/>
-              <a:t>10/1/2019</a:t>
+              <a:t>4/7/2021</a:t>
             </a:fld>
             <a:endParaRPr lang="en-US"/>
           </a:p>
@@ -2942,7 +2942,7 @@
           <a:p>
             <a:fld id="{4536FCE1-CC95-43C2-9AFE-9E28C1121DF5}" type="datetimeFigureOut">
               <a:rPr lang="en-US" smtClean="0"/>
-              <a:t>10/1/2019</a:t>
+              <a:t>4/7/2021</a:t>
             </a:fld>
             <a:endParaRPr lang="en-US"/>
           </a:p>
@@ -3474,7 +3474,7 @@
               <a:rPr lang="en-US" dirty="0">
                 <a:hlinkClick r:id="rId2"/>
               </a:rPr>
-              <a:t>https://cdpn.io/bezrukovyra/debug/BaBXjKN/XxkVwjLgXvmM</a:t>
+              <a:t>https://codepen.io/bezrukovyra/full/BaBXjKN</a:t>
             </a:r>
             <a:endParaRPr lang="en-US" dirty="0"/>
           </a:p>
@@ -3766,11 +3766,7 @@
               <a:rPr lang="en-US" sz="1200" dirty="0">
                 <a:hlinkClick r:id="rId2"/>
               </a:rPr>
-              <a:t>https://cdpn.io/bezrukovyra/debug/OJLKyqe/XBkGRqJzdNPA</a:t>
-            </a:r>
-            <a:r>
-              <a:rPr lang="ru-RU" sz="1200" dirty="0"/>
-              <a:t> </a:t>
+              <a:t>https://codepen.io/bezrukovyra/full/OJLKyqe</a:t>
             </a:r>
             <a:r>
               <a:rPr lang="ru-RU" dirty="0"/>
@@ -4867,7 +4863,7 @@
               <a:rPr lang="en-US" dirty="0">
                 <a:hlinkClick r:id="rId2"/>
               </a:rPr>
-              <a:t>https://cdpn.io/bezrukovyra/debug/rNBXOex/xnrabZOXqPgA</a:t>
+              <a:t>https://codepen.io/bezrukovyra/full/rNBXOex/</a:t>
             </a:r>
             <a:endParaRPr lang="en-US" dirty="0"/>
           </a:p>

</xml_diff>